<commit_message>
feat(): ready for demo ;)
</commit_message>
<xml_diff>
--- a/documentation/trigerQuestionPresentation.pptx
+++ b/documentation/trigerQuestionPresentation.pptx
@@ -7,6 +7,10 @@
   <p:sldIdLst>
     <p:sldId id="256" r:id="rId2"/>
     <p:sldId id="257" r:id="rId3"/>
+    <p:sldId id="260" r:id="rId4"/>
+    <p:sldId id="259" r:id="rId5"/>
+    <p:sldId id="258" r:id="rId6"/>
+    <p:sldId id="261" r:id="rId7"/>
   </p:sldIdLst>
   <p:sldSz cx="12192000" cy="6858000"/>
   <p:notesSz cx="6858000" cy="9144000"/>
@@ -105,6 +109,11 @@
       </a:defRPr>
     </a:lvl9pPr>
   </p:defaultTextStyle>
+  <p:extLst>
+    <p:ext uri="{EFAFB233-063F-42B5-8137-9DF3F51BA10A}">
+      <p15:sldGuideLst xmlns:p15="http://schemas.microsoft.com/office/powerpoint/2012/main"/>
+    </p:ext>
+  </p:extLst>
 </p:presentation>
 </file>
 
@@ -259,7 +268,7 @@
           <a:p>
             <a:fld id="{CFA57000-FF74-48F1-8391-5140CC005C1D}" type="datetimeFigureOut">
               <a:rPr lang="en-US" smtClean="0"/>
-              <a:t>1/20/2018</a:t>
+              <a:t>1/21/2018</a:t>
             </a:fld>
             <a:endParaRPr lang="en-US"/>
           </a:p>
@@ -457,7 +466,7 @@
           <a:p>
             <a:fld id="{CFA57000-FF74-48F1-8391-5140CC005C1D}" type="datetimeFigureOut">
               <a:rPr lang="en-US" smtClean="0"/>
-              <a:t>1/20/2018</a:t>
+              <a:t>1/21/2018</a:t>
             </a:fld>
             <a:endParaRPr lang="en-US"/>
           </a:p>
@@ -665,7 +674,7 @@
           <a:p>
             <a:fld id="{CFA57000-FF74-48F1-8391-5140CC005C1D}" type="datetimeFigureOut">
               <a:rPr lang="en-US" smtClean="0"/>
-              <a:t>1/20/2018</a:t>
+              <a:t>1/21/2018</a:t>
             </a:fld>
             <a:endParaRPr lang="en-US"/>
           </a:p>
@@ -863,7 +872,7 @@
           <a:p>
             <a:fld id="{CFA57000-FF74-48F1-8391-5140CC005C1D}" type="datetimeFigureOut">
               <a:rPr lang="en-US" smtClean="0"/>
-              <a:t>1/20/2018</a:t>
+              <a:t>1/21/2018</a:t>
             </a:fld>
             <a:endParaRPr lang="en-US"/>
           </a:p>
@@ -1138,7 +1147,7 @@
           <a:p>
             <a:fld id="{CFA57000-FF74-48F1-8391-5140CC005C1D}" type="datetimeFigureOut">
               <a:rPr lang="en-US" smtClean="0"/>
-              <a:t>1/20/2018</a:t>
+              <a:t>1/21/2018</a:t>
             </a:fld>
             <a:endParaRPr lang="en-US"/>
           </a:p>
@@ -1403,7 +1412,7 @@
           <a:p>
             <a:fld id="{CFA57000-FF74-48F1-8391-5140CC005C1D}" type="datetimeFigureOut">
               <a:rPr lang="en-US" smtClean="0"/>
-              <a:t>1/20/2018</a:t>
+              <a:t>1/21/2018</a:t>
             </a:fld>
             <a:endParaRPr lang="en-US"/>
           </a:p>
@@ -1815,7 +1824,7 @@
           <a:p>
             <a:fld id="{CFA57000-FF74-48F1-8391-5140CC005C1D}" type="datetimeFigureOut">
               <a:rPr lang="en-US" smtClean="0"/>
-              <a:t>1/20/2018</a:t>
+              <a:t>1/21/2018</a:t>
             </a:fld>
             <a:endParaRPr lang="en-US"/>
           </a:p>
@@ -1956,7 +1965,7 @@
           <a:p>
             <a:fld id="{CFA57000-FF74-48F1-8391-5140CC005C1D}" type="datetimeFigureOut">
               <a:rPr lang="en-US" smtClean="0"/>
-              <a:t>1/20/2018</a:t>
+              <a:t>1/21/2018</a:t>
             </a:fld>
             <a:endParaRPr lang="en-US"/>
           </a:p>
@@ -2069,7 +2078,7 @@
           <a:p>
             <a:fld id="{CFA57000-FF74-48F1-8391-5140CC005C1D}" type="datetimeFigureOut">
               <a:rPr lang="en-US" smtClean="0"/>
-              <a:t>1/20/2018</a:t>
+              <a:t>1/21/2018</a:t>
             </a:fld>
             <a:endParaRPr lang="en-US"/>
           </a:p>
@@ -2380,7 +2389,7 @@
           <a:p>
             <a:fld id="{CFA57000-FF74-48F1-8391-5140CC005C1D}" type="datetimeFigureOut">
               <a:rPr lang="en-US" smtClean="0"/>
-              <a:t>1/20/2018</a:t>
+              <a:t>1/21/2018</a:t>
             </a:fld>
             <a:endParaRPr lang="en-US"/>
           </a:p>
@@ -2668,7 +2677,7 @@
           <a:p>
             <a:fld id="{CFA57000-FF74-48F1-8391-5140CC005C1D}" type="datetimeFigureOut">
               <a:rPr lang="en-US" smtClean="0"/>
-              <a:t>1/20/2018</a:t>
+              <a:t>1/21/2018</a:t>
             </a:fld>
             <a:endParaRPr lang="en-US"/>
           </a:p>
@@ -2909,7 +2918,7 @@
           <a:p>
             <a:fld id="{CFA57000-FF74-48F1-8391-5140CC005C1D}" type="datetimeFigureOut">
               <a:rPr lang="en-US" smtClean="0"/>
-              <a:t>1/20/2018</a:t>
+              <a:t>1/21/2018</a:t>
             </a:fld>
             <a:endParaRPr lang="en-US"/>
           </a:p>
@@ -3347,7 +3356,15 @@
           <a:bodyPr/>
           <a:lstStyle/>
           <a:p>
-            <a:endParaRPr lang="en-US"/>
+            <a:r>
+              <a:rPr lang="en-US" dirty="0" err="1"/>
+              <a:t>EudAssistent</a:t>
+            </a:r>
+            <a:r>
+              <a:rPr lang="en-US"/>
+              <a:t> Demo</a:t>
+            </a:r>
+            <a:endParaRPr lang="en-US" dirty="0"/>
           </a:p>
         </p:txBody>
       </p:sp>
@@ -3372,7 +3389,10 @@
           <a:bodyPr/>
           <a:lstStyle/>
           <a:p>
-            <a:endParaRPr lang="en-US"/>
+            <a:r>
+              <a:rPr lang="en-US" dirty="0"/>
+              <a:t>Vlad Fernoaga</a:t>
+            </a:r>
           </a:p>
         </p:txBody>
       </p:sp>
@@ -3429,7 +3449,7 @@
           <a:p>
             <a:r>
               <a:rPr lang="en-US" dirty="0"/>
-              <a:t>end of section 1</a:t>
+              <a:t>Check your knowledge in History</a:t>
             </a:r>
           </a:p>
         </p:txBody>
@@ -3457,9 +3477,9 @@
           <a:p>
             <a:r>
               <a:rPr lang="en-US" dirty="0">
-                <a:hlinkClick r:id="rId2" tooltip="Question1"/>
+                <a:hlinkClick r:id="rId2"/>
               </a:rPr>
-              <a:t>Check the knowledge</a:t>
+              <a:t>Trigger Question</a:t>
             </a:r>
             <a:endParaRPr lang="en-US" dirty="0"/>
           </a:p>
@@ -3469,6 +3489,362 @@
     <p:extLst>
       <p:ext uri="{BB962C8B-B14F-4D97-AF65-F5344CB8AC3E}">
         <p14:creationId xmlns:p14="http://schemas.microsoft.com/office/powerpoint/2010/main" val="1665995275"/>
+      </p:ext>
+    </p:extLst>
+  </p:cSld>
+  <p:clrMapOvr>
+    <a:masterClrMapping/>
+  </p:clrMapOvr>
+</p:sld>
+</file>
+
+<file path=ppt/slides/slide3.xml><?xml version="1.0" encoding="utf-8"?>
+<p:sld xmlns:a="http://schemas.openxmlformats.org/drawingml/2006/main" xmlns:r="http://schemas.openxmlformats.org/officeDocument/2006/relationships" xmlns:p="http://schemas.openxmlformats.org/presentationml/2006/main">
+  <p:cSld>
+    <p:spTree>
+      <p:nvGrpSpPr>
+        <p:cNvPr id="1" name=""/>
+        <p:cNvGrpSpPr/>
+        <p:nvPr/>
+      </p:nvGrpSpPr>
+      <p:grpSpPr>
+        <a:xfrm>
+          <a:off x="0" y="0"/>
+          <a:ext cx="0" cy="0"/>
+          <a:chOff x="0" y="0"/>
+          <a:chExt cx="0" cy="0"/>
+        </a:xfrm>
+      </p:grpSpPr>
+      <p:sp>
+        <p:nvSpPr>
+          <p:cNvPr id="2" name="Title 1">
+            <a:extLst>
+              <a:ext uri="{FF2B5EF4-FFF2-40B4-BE49-F238E27FC236}">
+                <a16:creationId xmlns:a16="http://schemas.microsoft.com/office/drawing/2014/main" id="{85C6A80A-435C-4502-BFB4-3756A57DC0AD}"/>
+              </a:ext>
+            </a:extLst>
+          </p:cNvPr>
+          <p:cNvSpPr>
+            <a:spLocks noGrp="1"/>
+          </p:cNvSpPr>
+          <p:nvPr>
+            <p:ph type="title"/>
+          </p:nvPr>
+        </p:nvSpPr>
+        <p:spPr/>
+        <p:txBody>
+          <a:bodyPr/>
+          <a:lstStyle/>
+          <a:p>
+            <a:r>
+              <a:rPr lang="en-US" dirty="0"/>
+              <a:t>Check your knowledge in History </a:t>
+            </a:r>
+          </a:p>
+        </p:txBody>
+      </p:sp>
+      <p:sp>
+        <p:nvSpPr>
+          <p:cNvPr id="3" name="Content Placeholder 2">
+            <a:extLst>
+              <a:ext uri="{FF2B5EF4-FFF2-40B4-BE49-F238E27FC236}">
+                <a16:creationId xmlns:a16="http://schemas.microsoft.com/office/drawing/2014/main" id="{F1E0AC77-CEEC-4910-8DCD-BD47AEB9E93E}"/>
+              </a:ext>
+            </a:extLst>
+          </p:cNvPr>
+          <p:cNvSpPr>
+            <a:spLocks noGrp="1"/>
+          </p:cNvSpPr>
+          <p:nvPr>
+            <p:ph idx="1"/>
+          </p:nvPr>
+        </p:nvSpPr>
+        <p:spPr/>
+        <p:txBody>
+          <a:bodyPr/>
+          <a:lstStyle/>
+          <a:p>
+            <a:r>
+              <a:rPr lang="en-US" dirty="0">
+                <a:hlinkClick r:id="rId2"/>
+              </a:rPr>
+              <a:t>Trigger Question</a:t>
+            </a:r>
+            <a:endParaRPr lang="en-US" dirty="0"/>
+          </a:p>
+        </p:txBody>
+      </p:sp>
+    </p:spTree>
+    <p:extLst>
+      <p:ext uri="{BB962C8B-B14F-4D97-AF65-F5344CB8AC3E}">
+        <p14:creationId xmlns:p14="http://schemas.microsoft.com/office/powerpoint/2010/main" val="4074730788"/>
+      </p:ext>
+    </p:extLst>
+  </p:cSld>
+  <p:clrMapOvr>
+    <a:masterClrMapping/>
+  </p:clrMapOvr>
+</p:sld>
+</file>
+
+<file path=ppt/slides/slide4.xml><?xml version="1.0" encoding="utf-8"?>
+<p:sld xmlns:a="http://schemas.openxmlformats.org/drawingml/2006/main" xmlns:r="http://schemas.openxmlformats.org/officeDocument/2006/relationships" xmlns:p="http://schemas.openxmlformats.org/presentationml/2006/main">
+  <p:cSld>
+    <p:spTree>
+      <p:nvGrpSpPr>
+        <p:cNvPr id="1" name=""/>
+        <p:cNvGrpSpPr/>
+        <p:nvPr/>
+      </p:nvGrpSpPr>
+      <p:grpSpPr>
+        <a:xfrm>
+          <a:off x="0" y="0"/>
+          <a:ext cx="0" cy="0"/>
+          <a:chOff x="0" y="0"/>
+          <a:chExt cx="0" cy="0"/>
+        </a:xfrm>
+      </p:grpSpPr>
+      <p:sp>
+        <p:nvSpPr>
+          <p:cNvPr id="2" name="Title 1">
+            <a:extLst>
+              <a:ext uri="{FF2B5EF4-FFF2-40B4-BE49-F238E27FC236}">
+                <a16:creationId xmlns:a16="http://schemas.microsoft.com/office/drawing/2014/main" id="{85C6A80A-435C-4502-BFB4-3756A57DC0AD}"/>
+              </a:ext>
+            </a:extLst>
+          </p:cNvPr>
+          <p:cNvSpPr>
+            <a:spLocks noGrp="1"/>
+          </p:cNvSpPr>
+          <p:nvPr>
+            <p:ph type="title"/>
+          </p:nvPr>
+        </p:nvSpPr>
+        <p:spPr/>
+        <p:txBody>
+          <a:bodyPr/>
+          <a:lstStyle/>
+          <a:p>
+            <a:r>
+              <a:rPr lang="en-US" dirty="0"/>
+              <a:t>Check your knowledge in Demography</a:t>
+            </a:r>
+          </a:p>
+        </p:txBody>
+      </p:sp>
+      <p:sp>
+        <p:nvSpPr>
+          <p:cNvPr id="3" name="Content Placeholder 2">
+            <a:extLst>
+              <a:ext uri="{FF2B5EF4-FFF2-40B4-BE49-F238E27FC236}">
+                <a16:creationId xmlns:a16="http://schemas.microsoft.com/office/drawing/2014/main" id="{F1E0AC77-CEEC-4910-8DCD-BD47AEB9E93E}"/>
+              </a:ext>
+            </a:extLst>
+          </p:cNvPr>
+          <p:cNvSpPr>
+            <a:spLocks noGrp="1"/>
+          </p:cNvSpPr>
+          <p:nvPr>
+            <p:ph idx="1"/>
+          </p:nvPr>
+        </p:nvSpPr>
+        <p:spPr/>
+        <p:txBody>
+          <a:bodyPr/>
+          <a:lstStyle/>
+          <a:p>
+            <a:r>
+              <a:rPr lang="en-US" dirty="0">
+                <a:hlinkClick r:id="rId2"/>
+              </a:rPr>
+              <a:t>Trigger Question</a:t>
+            </a:r>
+            <a:endParaRPr lang="en-US" dirty="0"/>
+          </a:p>
+        </p:txBody>
+      </p:sp>
+    </p:spTree>
+    <p:extLst>
+      <p:ext uri="{BB962C8B-B14F-4D97-AF65-F5344CB8AC3E}">
+        <p14:creationId xmlns:p14="http://schemas.microsoft.com/office/powerpoint/2010/main" val="362961392"/>
+      </p:ext>
+    </p:extLst>
+  </p:cSld>
+  <p:clrMapOvr>
+    <a:masterClrMapping/>
+  </p:clrMapOvr>
+</p:sld>
+</file>
+
+<file path=ppt/slides/slide5.xml><?xml version="1.0" encoding="utf-8"?>
+<p:sld xmlns:a="http://schemas.openxmlformats.org/drawingml/2006/main" xmlns:r="http://schemas.openxmlformats.org/officeDocument/2006/relationships" xmlns:p="http://schemas.openxmlformats.org/presentationml/2006/main">
+  <p:cSld>
+    <p:spTree>
+      <p:nvGrpSpPr>
+        <p:cNvPr id="1" name=""/>
+        <p:cNvGrpSpPr/>
+        <p:nvPr/>
+      </p:nvGrpSpPr>
+      <p:grpSpPr>
+        <a:xfrm>
+          <a:off x="0" y="0"/>
+          <a:ext cx="0" cy="0"/>
+          <a:chOff x="0" y="0"/>
+          <a:chExt cx="0" cy="0"/>
+        </a:xfrm>
+      </p:grpSpPr>
+      <p:sp>
+        <p:nvSpPr>
+          <p:cNvPr id="2" name="Title 1">
+            <a:extLst>
+              <a:ext uri="{FF2B5EF4-FFF2-40B4-BE49-F238E27FC236}">
+                <a16:creationId xmlns:a16="http://schemas.microsoft.com/office/drawing/2014/main" id="{85C6A80A-435C-4502-BFB4-3756A57DC0AD}"/>
+              </a:ext>
+            </a:extLst>
+          </p:cNvPr>
+          <p:cNvSpPr>
+            <a:spLocks noGrp="1"/>
+          </p:cNvSpPr>
+          <p:nvPr>
+            <p:ph type="title"/>
+          </p:nvPr>
+        </p:nvSpPr>
+        <p:spPr/>
+        <p:txBody>
+          <a:bodyPr/>
+          <a:lstStyle/>
+          <a:p>
+            <a:r>
+              <a:rPr lang="en-US" dirty="0"/>
+              <a:t>Check your knowledge in Geography</a:t>
+            </a:r>
+          </a:p>
+        </p:txBody>
+      </p:sp>
+      <p:sp>
+        <p:nvSpPr>
+          <p:cNvPr id="3" name="Content Placeholder 2">
+            <a:extLst>
+              <a:ext uri="{FF2B5EF4-FFF2-40B4-BE49-F238E27FC236}">
+                <a16:creationId xmlns:a16="http://schemas.microsoft.com/office/drawing/2014/main" id="{F1E0AC77-CEEC-4910-8DCD-BD47AEB9E93E}"/>
+              </a:ext>
+            </a:extLst>
+          </p:cNvPr>
+          <p:cNvSpPr>
+            <a:spLocks noGrp="1"/>
+          </p:cNvSpPr>
+          <p:nvPr>
+            <p:ph idx="1"/>
+          </p:nvPr>
+        </p:nvSpPr>
+        <p:spPr/>
+        <p:txBody>
+          <a:bodyPr/>
+          <a:lstStyle/>
+          <a:p>
+            <a:r>
+              <a:rPr lang="en-US" dirty="0">
+                <a:hlinkClick r:id="rId2"/>
+              </a:rPr>
+              <a:t>Trigger Question</a:t>
+            </a:r>
+            <a:endParaRPr lang="en-US" dirty="0"/>
+          </a:p>
+        </p:txBody>
+      </p:sp>
+    </p:spTree>
+    <p:extLst>
+      <p:ext uri="{BB962C8B-B14F-4D97-AF65-F5344CB8AC3E}">
+        <p14:creationId xmlns:p14="http://schemas.microsoft.com/office/powerpoint/2010/main" val="1821417949"/>
+      </p:ext>
+    </p:extLst>
+  </p:cSld>
+  <p:clrMapOvr>
+    <a:masterClrMapping/>
+  </p:clrMapOvr>
+</p:sld>
+</file>
+
+<file path=ppt/slides/slide6.xml><?xml version="1.0" encoding="utf-8"?>
+<p:sld xmlns:a="http://schemas.openxmlformats.org/drawingml/2006/main" xmlns:r="http://schemas.openxmlformats.org/officeDocument/2006/relationships" xmlns:p="http://schemas.openxmlformats.org/presentationml/2006/main">
+  <p:cSld>
+    <p:spTree>
+      <p:nvGrpSpPr>
+        <p:cNvPr id="1" name=""/>
+        <p:cNvGrpSpPr/>
+        <p:nvPr/>
+      </p:nvGrpSpPr>
+      <p:grpSpPr>
+        <a:xfrm>
+          <a:off x="0" y="0"/>
+          <a:ext cx="0" cy="0"/>
+          <a:chOff x="0" y="0"/>
+          <a:chExt cx="0" cy="0"/>
+        </a:xfrm>
+      </p:grpSpPr>
+      <p:sp>
+        <p:nvSpPr>
+          <p:cNvPr id="2" name="Title 1">
+            <a:extLst>
+              <a:ext uri="{FF2B5EF4-FFF2-40B4-BE49-F238E27FC236}">
+                <a16:creationId xmlns:a16="http://schemas.microsoft.com/office/drawing/2014/main" id="{85C6A80A-435C-4502-BFB4-3756A57DC0AD}"/>
+              </a:ext>
+            </a:extLst>
+          </p:cNvPr>
+          <p:cNvSpPr>
+            <a:spLocks noGrp="1"/>
+          </p:cNvSpPr>
+          <p:nvPr>
+            <p:ph type="title"/>
+          </p:nvPr>
+        </p:nvSpPr>
+        <p:spPr/>
+        <p:txBody>
+          <a:bodyPr/>
+          <a:lstStyle/>
+          <a:p>
+            <a:r>
+              <a:rPr lang="en-US" dirty="0"/>
+              <a:t>Check your knowledge in engineering</a:t>
+            </a:r>
+          </a:p>
+        </p:txBody>
+      </p:sp>
+      <p:sp>
+        <p:nvSpPr>
+          <p:cNvPr id="3" name="Content Placeholder 2">
+            <a:extLst>
+              <a:ext uri="{FF2B5EF4-FFF2-40B4-BE49-F238E27FC236}">
+                <a16:creationId xmlns:a16="http://schemas.microsoft.com/office/drawing/2014/main" id="{F1E0AC77-CEEC-4910-8DCD-BD47AEB9E93E}"/>
+              </a:ext>
+            </a:extLst>
+          </p:cNvPr>
+          <p:cNvSpPr>
+            <a:spLocks noGrp="1"/>
+          </p:cNvSpPr>
+          <p:nvPr>
+            <p:ph idx="1"/>
+          </p:nvPr>
+        </p:nvSpPr>
+        <p:spPr/>
+        <p:txBody>
+          <a:bodyPr/>
+          <a:lstStyle/>
+          <a:p>
+            <a:r>
+              <a:rPr lang="en-US" dirty="0">
+                <a:hlinkClick r:id="rId2"/>
+              </a:rPr>
+              <a:t>Trigger Question</a:t>
+            </a:r>
+            <a:endParaRPr lang="en-US" dirty="0"/>
+          </a:p>
+        </p:txBody>
+      </p:sp>
+    </p:spTree>
+    <p:extLst>
+      <p:ext uri="{BB962C8B-B14F-4D97-AF65-F5344CB8AC3E}">
+        <p14:creationId xmlns:p14="http://schemas.microsoft.com/office/powerpoint/2010/main" val="1382899957"/>
       </p:ext>
     </p:extLst>
   </p:cSld>

</xml_diff>